<commit_message>
update practical exercises and answers
</commit_message>
<xml_diff>
--- a/LectureFiles/cbw/2018/RNASeq_Module3_Lecture.pptx
+++ b/LectureFiles/cbw/2018/RNASeq_Module3_Lecture.pptx
@@ -275,7 +275,7 @@
               <a:pPr>
                 <a:defRPr/>
               </a:pPr>
-              <a:t>5/22/18</a:t>
+              <a:t>5/29/18</a:t>
             </a:fld>
             <a:endParaRPr lang="en-US"/>
           </a:p>
@@ -490,7 +490,7 @@
               <a:pPr>
                 <a:defRPr/>
               </a:pPr>
-              <a:t>5/22/18</a:t>
+              <a:t>5/29/18</a:t>
             </a:fld>
             <a:endParaRPr lang="en-US"/>
           </a:p>
@@ -4330,7 +4330,7 @@
               <a:pPr>
                 <a:defRPr/>
               </a:pPr>
-              <a:t>5/22/18</a:t>
+              <a:t>5/29/18</a:t>
             </a:fld>
             <a:endParaRPr lang="en-US"/>
           </a:p>
@@ -6702,8 +6702,8 @@
         </p:nvSpPr>
         <p:spPr>
           <a:xfrm>
-            <a:off x="179512" y="908720"/>
-            <a:ext cx="8839200" cy="5328592"/>
+            <a:off x="179512" y="692696"/>
+            <a:ext cx="8839200" cy="5616624"/>
           </a:xfrm>
         </p:spPr>
         <p:txBody>
@@ -6847,7 +6847,14 @@
                 <a:latin typeface="Calibri" charset="0"/>
                 <a:ea typeface="ＭＳ Ｐゴシック" charset="0"/>
               </a:rPr>
-              <a:t>More robust statistical methods for differential </a:t>
+              <a:t>More robust statistical methods for </a:t>
+            </a:r>
+            <a:r>
+              <a:rPr lang="en-US" dirty="0" smtClean="0">
+                <a:latin typeface="Calibri" charset="0"/>
+                <a:ea typeface="ＭＳ Ｐゴシック" charset="0"/>
+              </a:rPr>
+              <a:t>differential *gene* </a:t>
             </a:r>
             <a:r>
               <a:rPr lang="en-US" dirty="0" smtClean="0">
@@ -8429,6 +8436,49 @@
               </a:rPr>
               <a:t>pathway</a:t>
             </a:r>
+            <a:endParaRPr lang="en-US" dirty="0" smtClean="0">
+              <a:latin typeface="Calibri" charset="0"/>
+              <a:ea typeface="ＭＳ Ｐゴシック" charset="0"/>
+            </a:endParaRPr>
+          </a:p>
+          <a:p>
+            <a:pPr lvl="1"/>
+            <a:endParaRPr lang="en-US" dirty="0">
+              <a:latin typeface="Calibri" charset="0"/>
+              <a:ea typeface="ＭＳ Ｐゴシック" charset="0"/>
+            </a:endParaRPr>
+          </a:p>
+          <a:p>
+            <a:r>
+              <a:rPr lang="en-US" dirty="0" smtClean="0">
+                <a:latin typeface="Calibri" charset="0"/>
+                <a:ea typeface="ＭＳ Ｐゴシック" charset="0"/>
+              </a:rPr>
+              <a:t>See </a:t>
+            </a:r>
+            <a:r>
+              <a:rPr lang="en-US" dirty="0" smtClean="0">
+                <a:latin typeface="Calibri" charset="0"/>
+                <a:ea typeface="ＭＳ Ｐゴシック" charset="0"/>
+                <a:hlinkClick r:id="rId3"/>
+              </a:rPr>
+              <a:t>www.genviz.org</a:t>
+            </a:r>
+            <a:r>
+              <a:rPr lang="en-US" dirty="0" smtClean="0">
+                <a:latin typeface="Calibri" charset="0"/>
+                <a:ea typeface="ＭＳ Ｐゴシック" charset="0"/>
+              </a:rPr>
+              <a:t> (Differential Expression and Pathway Analysis sections)</a:t>
+            </a:r>
+          </a:p>
+          <a:p>
+            <a:endParaRPr lang="en-US" dirty="0">
+              <a:latin typeface="Calibri" charset="0"/>
+              <a:ea typeface="ＭＳ Ｐゴシック" charset="0"/>
+            </a:endParaRPr>
+          </a:p>
+          <a:p>
             <a:endParaRPr lang="en-US" dirty="0" smtClean="0">
               <a:latin typeface="Calibri" charset="0"/>
               <a:ea typeface="ＭＳ Ｐゴシック" charset="0"/>
@@ -12111,14 +12161,7 @@
                 <a:latin typeface="Calibri" charset="0"/>
                 <a:ea typeface="ＭＳ Ｐゴシック" charset="0"/>
               </a:rPr>
-              <a:t>of </a:t>
-            </a:r>
-            <a:r>
-              <a:rPr lang="en-US" dirty="0">
-                <a:latin typeface="Calibri" charset="0"/>
-                <a:ea typeface="ＭＳ Ｐゴシック" charset="0"/>
-              </a:rPr>
-              <a:t>m</a:t>
+              <a:t>of m</a:t>
             </a:r>
             <a:r>
               <a:rPr lang="en-US" dirty="0" smtClean="0">
@@ -12716,9 +12759,180 @@
   <p:timing>
     <p:tnLst>
       <p:par>
-        <p:cTn xmlns:p14="http://schemas.microsoft.com/office/powerpoint/2010/main" id="1" dur="indefinite" restart="never" nodeType="tmRoot"/>
+        <p:cTn xmlns:p14="http://schemas.microsoft.com/office/powerpoint/2010/main" id="1" dur="indefinite" restart="never" nodeType="tmRoot">
+          <p:childTnLst>
+            <p:seq concurrent="1" nextAc="seek">
+              <p:cTn id="2" dur="indefinite" nodeType="mainSeq">
+                <p:childTnLst>
+                  <p:par>
+                    <p:cTn id="3" fill="hold">
+                      <p:stCondLst>
+                        <p:cond delay="indefinite"/>
+                      </p:stCondLst>
+                      <p:childTnLst>
+                        <p:par>
+                          <p:cTn id="4" fill="hold">
+                            <p:stCondLst>
+                              <p:cond delay="0"/>
+                            </p:stCondLst>
+                            <p:childTnLst>
+                              <p:par>
+                                <p:cTn id="5" presetID="1" presetClass="entr" presetSubtype="0" fill="hold" nodeType="clickEffect">
+                                  <p:stCondLst>
+                                    <p:cond delay="0"/>
+                                  </p:stCondLst>
+                                  <p:childTnLst>
+                                    <p:set>
+                                      <p:cBhvr>
+                                        <p:cTn id="6" dur="1" fill="hold">
+                                          <p:stCondLst>
+                                            <p:cond delay="0"/>
+                                          </p:stCondLst>
+                                        </p:cTn>
+                                        <p:tgtEl>
+                                          <p:spTgt spid="6"/>
+                                        </p:tgtEl>
+                                        <p:attrNameLst>
+                                          <p:attrName>style.visibility</p:attrName>
+                                        </p:attrNameLst>
+                                      </p:cBhvr>
+                                      <p:to>
+                                        <p:strVal val="visible"/>
+                                      </p:to>
+                                    </p:set>
+                                  </p:childTnLst>
+                                </p:cTn>
+                              </p:par>
+                              <p:par>
+                                <p:cTn id="7" presetID="1" presetClass="entr" presetSubtype="0" fill="hold" grpId="0" nodeType="withEffect">
+                                  <p:stCondLst>
+                                    <p:cond delay="0"/>
+                                  </p:stCondLst>
+                                  <p:childTnLst>
+                                    <p:set>
+                                      <p:cBhvr>
+                                        <p:cTn id="8" dur="1" fill="hold">
+                                          <p:stCondLst>
+                                            <p:cond delay="0"/>
+                                          </p:stCondLst>
+                                        </p:cTn>
+                                        <p:tgtEl>
+                                          <p:spTgt spid="27652"/>
+                                        </p:tgtEl>
+                                        <p:attrNameLst>
+                                          <p:attrName>style.visibility</p:attrName>
+                                        </p:attrNameLst>
+                                      </p:cBhvr>
+                                      <p:to>
+                                        <p:strVal val="visible"/>
+                                      </p:to>
+                                    </p:set>
+                                  </p:childTnLst>
+                                </p:cTn>
+                              </p:par>
+                            </p:childTnLst>
+                          </p:cTn>
+                        </p:par>
+                      </p:childTnLst>
+                    </p:cTn>
+                  </p:par>
+                  <p:par>
+                    <p:cTn id="9" fill="hold">
+                      <p:stCondLst>
+                        <p:cond delay="indefinite"/>
+                      </p:stCondLst>
+                      <p:childTnLst>
+                        <p:par>
+                          <p:cTn id="10" fill="hold">
+                            <p:stCondLst>
+                              <p:cond delay="0"/>
+                            </p:stCondLst>
+                            <p:childTnLst>
+                              <p:par>
+                                <p:cTn id="11" presetID="1" presetClass="entr" presetSubtype="0" fill="hold" nodeType="clickEffect">
+                                  <p:stCondLst>
+                                    <p:cond delay="0"/>
+                                  </p:stCondLst>
+                                  <p:childTnLst>
+                                    <p:set>
+                                      <p:cBhvr>
+                                        <p:cTn id="12" dur="1" fill="hold">
+                                          <p:stCondLst>
+                                            <p:cond delay="0"/>
+                                          </p:stCondLst>
+                                        </p:cTn>
+                                        <p:tgtEl>
+                                          <p:spTgt spid="8"/>
+                                        </p:tgtEl>
+                                        <p:attrNameLst>
+                                          <p:attrName>style.visibility</p:attrName>
+                                        </p:attrNameLst>
+                                      </p:cBhvr>
+                                      <p:to>
+                                        <p:strVal val="visible"/>
+                                      </p:to>
+                                    </p:set>
+                                  </p:childTnLst>
+                                </p:cTn>
+                              </p:par>
+                              <p:par>
+                                <p:cTn id="13" presetID="1" presetClass="entr" presetSubtype="0" fill="hold" grpId="0" nodeType="withEffect">
+                                  <p:stCondLst>
+                                    <p:cond delay="0"/>
+                                  </p:stCondLst>
+                                  <p:childTnLst>
+                                    <p:set>
+                                      <p:cBhvr>
+                                        <p:cTn id="14" dur="1" fill="hold">
+                                          <p:stCondLst>
+                                            <p:cond delay="0"/>
+                                          </p:stCondLst>
+                                        </p:cTn>
+                                        <p:tgtEl>
+                                          <p:spTgt spid="27654"/>
+                                        </p:tgtEl>
+                                        <p:attrNameLst>
+                                          <p:attrName>style.visibility</p:attrName>
+                                        </p:attrNameLst>
+                                      </p:cBhvr>
+                                      <p:to>
+                                        <p:strVal val="visible"/>
+                                      </p:to>
+                                    </p:set>
+                                  </p:childTnLst>
+                                </p:cTn>
+                              </p:par>
+                            </p:childTnLst>
+                          </p:cTn>
+                        </p:par>
+                      </p:childTnLst>
+                    </p:cTn>
+                  </p:par>
+                </p:childTnLst>
+              </p:cTn>
+              <p:prevCondLst>
+                <p:cond evt="onPrev" delay="0">
+                  <p:tgtEl>
+                    <p:sldTgt/>
+                  </p:tgtEl>
+                </p:cond>
+              </p:prevCondLst>
+              <p:nextCondLst>
+                <p:cond evt="onNext" delay="0">
+                  <p:tgtEl>
+                    <p:sldTgt/>
+                  </p:tgtEl>
+                </p:cond>
+              </p:nextCondLst>
+            </p:seq>
+          </p:childTnLst>
+        </p:cTn>
       </p:par>
     </p:tnLst>
+    <p:bldLst>
+      <p:bldP spid="27652" grpId="0"/>
+      <p:bldP spid="27654" grpId="0"/>
+    </p:bldLst>
   </p:timing>
 </p:sld>
 </file>

</xml_diff>

<commit_message>
minor updates to lecture 3 and trinity headings
</commit_message>
<xml_diff>
--- a/LectureFiles/cbw/2018/RNASeq_Module3_Lecture.pptx
+++ b/LectureFiles/cbw/2018/RNASeq_Module3_Lecture.pptx
@@ -13465,7 +13465,7 @@
         </p:spPr>
         <p:txBody>
           <a:bodyPr>
-            <a:normAutofit fontScale="85000" lnSpcReduction="20000"/>
+            <a:normAutofit fontScale="77500" lnSpcReduction="20000"/>
           </a:bodyPr>
           <a:lstStyle/>
           <a:p>
@@ -13499,7 +13499,15 @@
             <a:pPr lvl="2"/>
             <a:r>
               <a:rPr lang="en-US" dirty="0" smtClean="0"/>
-              <a:t>1) Determine total sample fragment count and divide by 1,000,000</a:t>
+              <a:t>1) Determine total </a:t>
+            </a:r>
+            <a:r>
+              <a:rPr lang="en-US" dirty="0" smtClean="0"/>
+              <a:t>library/sample </a:t>
+            </a:r>
+            <a:r>
+              <a:rPr lang="en-US" dirty="0" smtClean="0"/>
+              <a:t>fragment count and divide by 1,000,000</a:t>
             </a:r>
           </a:p>
           <a:p>
@@ -13557,7 +13565,27 @@
             <a:pPr lvl="2"/>
             <a:r>
               <a:rPr lang="en-US" dirty="0" smtClean="0"/>
-              <a:t>1) Divide each fragment count by length of each transcript in </a:t>
+              <a:t>1) Divide each </a:t>
+            </a:r>
+            <a:r>
+              <a:rPr lang="en-US" dirty="0" smtClean="0"/>
+              <a:t>gene/transcript </a:t>
+            </a:r>
+            <a:r>
+              <a:rPr lang="en-US" dirty="0" smtClean="0"/>
+              <a:t>fragment </a:t>
+            </a:r>
+            <a:r>
+              <a:rPr lang="en-US" dirty="0" smtClean="0"/>
+              <a:t>count by length of each </a:t>
+            </a:r>
+            <a:r>
+              <a:rPr lang="en-US" dirty="0" smtClean="0"/>
+              <a:t>gene/transcript </a:t>
+            </a:r>
+            <a:r>
+              <a:rPr lang="en-US" dirty="0" smtClean="0"/>
+              <a:t>in </a:t>
             </a:r>
             <a:r>
               <a:rPr lang="en-US" dirty="0" err="1" smtClean="0"/>

</xml_diff>